<commit_message>
changes summary of presentation
</commit_message>
<xml_diff>
--- a/presentation/team_presentation_mightyTextAdventure.pptx
+++ b/presentation/team_presentation_mightyTextAdventure.pptx
@@ -3503,7 +3503,7 @@
                 <a:ea typeface="Arial"/>
                 <a:cs typeface="Arial"/>
               </a:rPr>
-              <a:t>summary of task</a:t>
+              <a:t>Summary of task</a:t>
             </a:r>
             <a:endParaRPr sz="2800" b="0" strike="noStrike" spc="0">
               <a:latin typeface="Arial"/>
@@ -3533,7 +3533,7 @@
                 <a:ea typeface="Arial"/>
                 <a:cs typeface="Arial"/>
               </a:rPr>
-              <a:t>summary of the week</a:t>
+              <a:t>Summary of the week</a:t>
             </a:r>
             <a:endParaRPr sz="2800" b="0" strike="noStrike" spc="0">
               <a:latin typeface="Arial"/>
@@ -3563,7 +3563,7 @@
                 <a:ea typeface="Arial"/>
                 <a:cs typeface="Arial"/>
               </a:rPr>
-              <a:t>code snippets</a:t>
+              <a:t>Code snippets</a:t>
             </a:r>
             <a:endParaRPr sz="2800" b="0" strike="noStrike" spc="0">
               <a:latin typeface="Arial"/>
@@ -3593,7 +3593,7 @@
                 <a:ea typeface="Arial"/>
                 <a:cs typeface="Arial"/>
               </a:rPr>
-              <a:t>lessons learned</a:t>
+              <a:t>Lessons learned</a:t>
             </a:r>
             <a:endParaRPr sz="2800" b="0" strike="noStrike" spc="0">
               <a:latin typeface="Arial"/>
@@ -3612,7 +3612,7 @@
                 <a:ea typeface="Arial"/>
                 <a:cs typeface="Arial"/>
               </a:rPr>
-              <a:t>demo of Pokemon page</a:t>
+              <a:t>Demo of Game</a:t>
             </a:r>
             <a:endParaRPr/>
           </a:p>
@@ -4826,7 +4826,7 @@
         <p:spPr bwMode="auto">
           <a:xfrm flipH="0" flipV="1">
             <a:off x="838198" y="1644894"/>
-            <a:ext cx="10515598" cy="0"/>
+            <a:ext cx="10515597" cy="0"/>
           </a:xfrm>
           <a:prstGeom prst="line">
             <a:avLst/>

</xml_diff>

<commit_message>
added something to summary of the week
</commit_message>
<xml_diff>
--- a/presentation/team_presentation_mightyTextAdventure.pptx
+++ b/presentation/team_presentation_mightyTextAdventure.pptx
@@ -3505,8 +3505,13 @@
               </a:rPr>
               <a:t>Summary of task</a:t>
             </a:r>
-            <a:endParaRPr sz="2800" b="0" strike="noStrike" spc="0">
+            <a:endParaRPr lang="en-US" sz="2800" b="0" i="0" u="none" strike="noStrike" cap="none" spc="0">
+              <a:solidFill>
+                <a:srgbClr val="000000"/>
+              </a:solidFill>
               <a:latin typeface="Arial"/>
+              <a:ea typeface="Arial"/>
+              <a:cs typeface="Arial"/>
             </a:endParaRPr>
           </a:p>
           <a:p>
@@ -3535,8 +3540,13 @@
               </a:rPr>
               <a:t>Summary of the week</a:t>
             </a:r>
-            <a:endParaRPr sz="2800" b="0" strike="noStrike" spc="0">
+            <a:endParaRPr lang="en-US" sz="2800" b="0" i="0" u="none" strike="noStrike" cap="none" spc="0">
+              <a:solidFill>
+                <a:srgbClr val="000000"/>
+              </a:solidFill>
               <a:latin typeface="Arial"/>
+              <a:ea typeface="Arial"/>
+              <a:cs typeface="Arial"/>
             </a:endParaRPr>
           </a:p>
           <a:p>
@@ -3595,8 +3605,13 @@
               </a:rPr>
               <a:t>Lessons learned</a:t>
             </a:r>
-            <a:endParaRPr sz="2800" b="0" strike="noStrike" spc="0">
+            <a:endParaRPr lang="en-US" sz="2800" b="0" i="0" u="none" strike="noStrike" cap="none" spc="0">
+              <a:solidFill>
+                <a:srgbClr val="000000"/>
+              </a:solidFill>
               <a:latin typeface="Arial"/>
+              <a:ea typeface="Arial"/>
+              <a:cs typeface="Arial"/>
             </a:endParaRPr>
           </a:p>
           <a:p>
@@ -4454,7 +4469,9 @@
                   <a:txBody>
                     <a:bodyPr/>
                     <a:p>
-                      <a:pPr>
+                      <a:pPr marL="283879" indent="-283879">
+                        <a:buFont typeface="Arial"/>
+                        <a:buChar char="–"/>
                         <a:defRPr/>
                       </a:pPr>
                       <a:r>
@@ -4471,7 +4488,9 @@
                       <a:endParaRPr sz="1800"/>
                     </a:p>
                     <a:p>
-                      <a:pPr>
+                      <a:pPr marL="283879" indent="-283879">
+                        <a:buFont typeface="Arial"/>
+                        <a:buChar char="–"/>
                         <a:defRPr/>
                       </a:pPr>
                       <a:r>
@@ -4500,7 +4519,7 @@
                           <a:ea typeface="+mn-ea"/>
                           <a:cs typeface="+mn-cs"/>
                         </a:rPr>
-                        <a:t>      - Adrian: Player mechanics, Game &amp; Battle Logic</a:t>
+                        <a:t>       - Adrian: Player mechanics, Game &amp; Battle Logic</a:t>
                       </a:r>
                       <a:endParaRPr sz="1800"/>
                     </a:p>
@@ -4517,7 +4536,7 @@
                           <a:ea typeface="+mn-ea"/>
                           <a:cs typeface="+mn-cs"/>
                         </a:rPr>
-                        <a:t>      - Agata: User Interface, Area &amp; Game Details</a:t>
+                        <a:t>       - Agata: User Interface, Area &amp; Game Details</a:t>
                       </a:r>
                       <a:endParaRPr/>
                     </a:p>
@@ -4553,7 +4572,9 @@
                   <a:txBody>
                     <a:bodyPr/>
                     <a:p>
-                      <a:pPr>
+                      <a:pPr marL="283879" indent="-283879">
+                        <a:buFont typeface="Arial"/>
+                        <a:buChar char="–"/>
                         <a:defRPr/>
                       </a:pPr>
                       <a:r>
@@ -4566,6 +4587,32 @@
                           <a:cs typeface="+mn-cs"/>
                         </a:rPr>
                         <a:t>Discussing progress in session</a:t>
+                      </a:r>
+                      <a:endParaRPr lang="en-US" sz="1800" b="0" i="0" u="none" strike="noStrike" cap="none" spc="0">
+                        <a:solidFill>
+                          <a:schemeClr val="dk1"/>
+                        </a:solidFill>
+                        <a:latin typeface="Arial"/>
+                        <a:ea typeface="Arial"/>
+                        <a:cs typeface="Arial"/>
+                      </a:endParaRPr>
+                    </a:p>
+                    <a:p>
+                      <a:pPr marL="283879" indent="-283879">
+                        <a:buFont typeface="Arial"/>
+                        <a:buChar char="–"/>
+                        <a:defRPr/>
+                      </a:pPr>
+                      <a:r>
+                        <a:rPr lang="en-US" sz="1800" b="0" i="0" u="none" strike="noStrike" cap="none" spc="0">
+                          <a:solidFill>
+                            <a:schemeClr val="dk1"/>
+                          </a:solidFill>
+                          <a:latin typeface="+mn-lt"/>
+                          <a:ea typeface="+mn-ea"/>
+                          <a:cs typeface="+mn-cs"/>
+                        </a:rPr>
+                        <a:t>Discussing next steps</a:t>
                       </a:r>
                       <a:endParaRPr/>
                     </a:p>
@@ -4594,7 +4641,9 @@
                   <a:txBody>
                     <a:bodyPr/>
                     <a:p>
-                      <a:pPr>
+                      <a:pPr marL="283879" indent="-283879">
+                        <a:buFont typeface="Arial"/>
+                        <a:buChar char="–"/>
                         <a:defRPr/>
                       </a:pPr>
                       <a:r>
@@ -4604,7 +4653,9 @@
                       <a:endParaRPr/>
                     </a:p>
                     <a:p>
-                      <a:pPr>
+                      <a:pPr marL="283879" indent="-283879">
+                        <a:buFont typeface="Arial"/>
+                        <a:buChar char="–"/>
                         <a:defRPr/>
                       </a:pPr>
                       <a:r>

</xml_diff>

<commit_message>
added slide to ppx
</commit_message>
<xml_diff>
--- a/presentation/team_presentation_mightyTextAdventure.pptx
+++ b/presentation/team_presentation_mightyTextAdventure.pptx
@@ -13,6 +13,7 @@
     <p:sldId id="261" r:id="rId8"/>
     <p:sldId id="262" r:id="rId9"/>
     <p:sldId id="263" r:id="rId10"/>
+    <p:sldId id="264" r:id="rId11"/>
   </p:sldIdLst>
   <p:sldSz cx="12192000" cy="6858000"/>
   <p:notesSz cx="12192000" cy="6858000"/>
@@ -4912,7 +4913,7 @@
       </p:pic>
       <p:pic>
         <p:nvPicPr>
-          <p:cNvPr id="1419771179" name=""/>
+          <p:cNvPr id="1736138914" name=""/>
           <p:cNvPicPr>
             <a:picLocks noChangeAspect="1"/>
           </p:cNvPicPr>
@@ -4924,58 +4925,46 @@
         </p:blipFill>
         <p:spPr bwMode="auto">
           <a:xfrm>
-            <a:off x="2546562" y="1797820"/>
-            <a:ext cx="1885950" cy="2152649"/>
+            <a:off x="3122760" y="1690683"/>
+            <a:ext cx="6838949" cy="4210049"/>
           </a:xfrm>
           <a:prstGeom prst="rect">
             <a:avLst/>
           </a:prstGeom>
         </p:spPr>
       </p:pic>
-      <p:pic>
-        <p:nvPicPr>
-          <p:cNvPr id="1555625735" name=""/>
-          <p:cNvPicPr>
-            <a:picLocks noChangeAspect="1"/>
-          </p:cNvPicPr>
+      <p:sp>
+        <p:nvSpPr>
+          <p:cNvPr id="277677978" name=""/>
+          <p:cNvSpPr txBox="1"/>
           <p:nvPr/>
-        </p:nvPicPr>
-        <p:blipFill>
-          <a:blip r:embed="rId5"/>
-          <a:stretch/>
-        </p:blipFill>
-        <p:spPr bwMode="auto">
-          <a:xfrm>
-            <a:off x="1141625" y="4089184"/>
-            <a:ext cx="4695824" cy="2466974"/>
+        </p:nvSpPr>
+        <p:spPr bwMode="auto">
+          <a:xfrm flipH="0" flipV="0">
+            <a:off x="1071122" y="1690683"/>
+            <a:ext cx="1771448" cy="366119"/>
           </a:xfrm>
           <a:prstGeom prst="rect">
             <a:avLst/>
           </a:prstGeom>
-        </p:spPr>
-      </p:pic>
-      <p:pic>
-        <p:nvPicPr>
-          <p:cNvPr id="1211944320" name=""/>
-          <p:cNvPicPr>
-            <a:picLocks noChangeAspect="1"/>
-          </p:cNvPicPr>
-          <p:nvPr/>
-        </p:nvPicPr>
-        <p:blipFill>
-          <a:blip r:embed="rId6"/>
-          <a:stretch/>
-        </p:blipFill>
-        <p:spPr bwMode="auto">
-          <a:xfrm>
-            <a:off x="6486520" y="2171838"/>
-            <a:ext cx="4867274" cy="3457575"/>
-          </a:xfrm>
-          <a:prstGeom prst="rect">
-            <a:avLst/>
-          </a:prstGeom>
-        </p:spPr>
-      </p:pic>
+          <a:noFill/>
+        </p:spPr>
+        <p:txBody>
+          <a:bodyPr vertOverflow="overflow" horzOverflow="overflow" vert="horz" wrap="square" lIns="91440" tIns="45720" rIns="91440" bIns="45720" numCol="1" spcCol="0" rtlCol="0" fromWordArt="0" anchor="t" anchorCtr="0" forceAA="0" upright="0" compatLnSpc="0">
+            <a:spAutoFit/>
+          </a:bodyPr>
+          <a:p>
+            <a:pPr>
+              <a:defRPr/>
+            </a:pPr>
+            <a:r>
+              <a:rPr/>
+              <a:t>before:</a:t>
+            </a:r>
+            <a:endParaRPr/>
+          </a:p>
+        </p:txBody>
+      </p:sp>
     </p:spTree>
   </p:cSld>
   <p:clrMapOvr>
@@ -5011,7 +5000,7 @@
       </p:grpSpPr>
       <p:sp>
         <p:nvSpPr>
-          <p:cNvPr id="2122781821" name="Title 1"/>
+          <p:cNvPr id="31772926" name="Title 1"/>
           <p:cNvSpPr>
             <a:spLocks noGrp="1"/>
           </p:cNvSpPr>
@@ -5021,8 +5010,8 @@
         </p:nvSpPr>
         <p:spPr bwMode="auto">
           <a:xfrm flipH="0" flipV="0">
-            <a:off x="838198" y="365124"/>
-            <a:ext cx="9998506" cy="1325562"/>
+            <a:off x="838197" y="365122"/>
+            <a:ext cx="9998505" cy="1325560"/>
           </a:xfrm>
         </p:spPr>
         <p:txBody>
@@ -5062,40 +5051,9 @@
           </a:p>
         </p:txBody>
       </p:sp>
-      <p:sp>
-        <p:nvSpPr>
-          <p:cNvPr id="265529569" name="Content Placeholder 2"/>
-          <p:cNvSpPr>
-            <a:spLocks noGrp="1"/>
-          </p:cNvSpPr>
-          <p:nvPr>
-            <p:ph idx="1"/>
-          </p:nvPr>
-        </p:nvSpPr>
-        <p:spPr bwMode="auto">
-          <a:xfrm flipH="0" flipV="0">
-            <a:off x="838198" y="1987426"/>
-            <a:ext cx="10515600" cy="4189534"/>
-          </a:xfrm>
-        </p:spPr>
-        <p:txBody>
-          <a:bodyPr/>
-          <a:lstStyle/>
-          <a:p>
-            <a:pPr>
-              <a:defRPr/>
-            </a:pPr>
-            <a:r>
-              <a:rPr/>
-              <a:t>Insert snippet here</a:t>
-            </a:r>
-            <a:endParaRPr/>
-          </a:p>
-        </p:txBody>
-      </p:sp>
       <p:pic>
         <p:nvPicPr>
-          <p:cNvPr id="1155730431" name=""/>
+          <p:cNvPr id="35621317" name=""/>
           <p:cNvPicPr>
             <a:picLocks noChangeAspect="1"/>
           </p:cNvPicPr>
@@ -5107,8 +5065,8 @@
         </p:blipFill>
         <p:spPr bwMode="auto">
           <a:xfrm flipH="0" flipV="0">
-            <a:off x="9255384" y="5896551"/>
-            <a:ext cx="2961029" cy="962156"/>
+            <a:off x="9255384" y="5896549"/>
+            <a:ext cx="2961027" cy="962154"/>
           </a:xfrm>
           <a:prstGeom prst="rect">
             <a:avLst/>
@@ -5117,7 +5075,7 @@
       </p:pic>
       <p:cxnSp>
         <p:nvCxnSpPr>
-          <p:cNvPr id="885732279" name=""/>
+          <p:cNvPr id="998702755" name=""/>
           <p:cNvCxnSpPr>
             <a:cxnSpLocks/>
           </p:cNvCxnSpPr>
@@ -5125,8 +5083,8 @@
         </p:nvCxnSpPr>
         <p:spPr bwMode="auto">
           <a:xfrm flipH="0" flipV="1">
-            <a:off x="4343221" y="1580534"/>
-            <a:ext cx="7010578" cy="0"/>
+            <a:off x="4343220" y="1580532"/>
+            <a:ext cx="7010577" cy="0"/>
           </a:xfrm>
           <a:prstGeom prst="line">
             <a:avLst/>
@@ -5160,7 +5118,7 @@
       </p:cxnSp>
       <p:cxnSp>
         <p:nvCxnSpPr>
-          <p:cNvPr id="579721613" name=""/>
+          <p:cNvPr id="2078456949" name=""/>
           <p:cNvCxnSpPr>
             <a:cxnSpLocks/>
           </p:cNvCxnSpPr>
@@ -5168,8 +5126,8 @@
         </p:nvCxnSpPr>
         <p:spPr bwMode="auto">
           <a:xfrm flipH="0" flipV="1">
-            <a:off x="838198" y="1644894"/>
-            <a:ext cx="10515599" cy="0"/>
+            <a:off x="838197" y="1644894"/>
+            <a:ext cx="10515596" cy="0"/>
           </a:xfrm>
           <a:prstGeom prst="line">
             <a:avLst/>
@@ -5203,7 +5161,7 @@
       </p:cxnSp>
       <p:pic>
         <p:nvPicPr>
-          <p:cNvPr id="243074642" name=""/>
+          <p:cNvPr id="552199741" name=""/>
           <p:cNvPicPr>
             <a:picLocks noChangeAspect="1"/>
           </p:cNvPicPr>
@@ -5215,14 +5173,112 @@
         </p:blipFill>
         <p:spPr bwMode="auto">
           <a:xfrm flipH="1" flipV="0">
-            <a:off x="10790911" y="681003"/>
-            <a:ext cx="635375" cy="693801"/>
+            <a:off x="10790910" y="681003"/>
+            <a:ext cx="635374" cy="693801"/>
           </a:xfrm>
           <a:prstGeom prst="rect">
             <a:avLst/>
           </a:prstGeom>
         </p:spPr>
       </p:pic>
+      <p:pic>
+        <p:nvPicPr>
+          <p:cNvPr id="1687525444" name=""/>
+          <p:cNvPicPr>
+            <a:picLocks noChangeAspect="1"/>
+          </p:cNvPicPr>
+          <p:nvPr/>
+        </p:nvPicPr>
+        <p:blipFill>
+          <a:blip r:embed="rId4"/>
+          <a:stretch/>
+        </p:blipFill>
+        <p:spPr bwMode="auto">
+          <a:xfrm>
+            <a:off x="2546561" y="1797819"/>
+            <a:ext cx="1885950" cy="2152648"/>
+          </a:xfrm>
+          <a:prstGeom prst="rect">
+            <a:avLst/>
+          </a:prstGeom>
+        </p:spPr>
+      </p:pic>
+      <p:pic>
+        <p:nvPicPr>
+          <p:cNvPr id="864414017" name=""/>
+          <p:cNvPicPr>
+            <a:picLocks noChangeAspect="1"/>
+          </p:cNvPicPr>
+          <p:nvPr/>
+        </p:nvPicPr>
+        <p:blipFill>
+          <a:blip r:embed="rId5"/>
+          <a:stretch/>
+        </p:blipFill>
+        <p:spPr bwMode="auto">
+          <a:xfrm>
+            <a:off x="1141624" y="4089183"/>
+            <a:ext cx="4695823" cy="2466973"/>
+          </a:xfrm>
+          <a:prstGeom prst="rect">
+            <a:avLst/>
+          </a:prstGeom>
+        </p:spPr>
+      </p:pic>
+      <p:pic>
+        <p:nvPicPr>
+          <p:cNvPr id="1750586280" name=""/>
+          <p:cNvPicPr>
+            <a:picLocks noChangeAspect="1"/>
+          </p:cNvPicPr>
+          <p:nvPr/>
+        </p:nvPicPr>
+        <p:blipFill>
+          <a:blip r:embed="rId6"/>
+          <a:stretch/>
+        </p:blipFill>
+        <p:spPr bwMode="auto">
+          <a:xfrm>
+            <a:off x="6486519" y="2171837"/>
+            <a:ext cx="4867273" cy="3457575"/>
+          </a:xfrm>
+          <a:prstGeom prst="rect">
+            <a:avLst/>
+          </a:prstGeom>
+        </p:spPr>
+      </p:pic>
+      <p:sp>
+        <p:nvSpPr>
+          <p:cNvPr id="1077544103" name=""/>
+          <p:cNvSpPr txBox="1"/>
+          <p:nvPr/>
+        </p:nvSpPr>
+        <p:spPr bwMode="auto">
+          <a:xfrm flipH="0" flipV="0">
+            <a:off x="1071121" y="1690683"/>
+            <a:ext cx="1774687" cy="366119"/>
+          </a:xfrm>
+          <a:prstGeom prst="rect">
+            <a:avLst/>
+          </a:prstGeom>
+          <a:noFill/>
+        </p:spPr>
+        <p:txBody>
+          <a:bodyPr vertOverflow="overflow" horzOverflow="overflow" vert="horz" wrap="square" lIns="91440" tIns="45720" rIns="91440" bIns="45720" numCol="1" spcCol="0" rtlCol="0" fromWordArt="0" anchor="t" anchorCtr="0" forceAA="0" upright="0" compatLnSpc="0">
+            <a:spAutoFit/>
+          </a:bodyPr>
+          <a:p>
+            <a:pPr>
+              <a:defRPr/>
+            </a:pPr>
+            <a:r>
+              <a:rPr/>
+              <a:t>after:</a:t>
+            </a:r>
+            <a:endParaRPr/>
+          </a:p>
+        </p:txBody>
+      </p:sp>
     </p:spTree>
   </p:cSld>
   <p:clrMapOvr>
@@ -5258,6 +5314,266 @@
       </p:grpSpPr>
       <p:sp>
         <p:nvSpPr>
+          <p:cNvPr id="2122781821" name="Title 1"/>
+          <p:cNvSpPr>
+            <a:spLocks noGrp="1"/>
+          </p:cNvSpPr>
+          <p:nvPr>
+            <p:ph type="title"/>
+          </p:nvPr>
+        </p:nvSpPr>
+        <p:spPr bwMode="auto">
+          <a:xfrm flipH="0" flipV="0">
+            <a:off x="838198" y="365124"/>
+            <a:ext cx="9998506" cy="1325562"/>
+          </a:xfrm>
+        </p:spPr>
+        <p:txBody>
+          <a:bodyPr/>
+          <a:lstStyle/>
+          <a:p>
+            <a:pPr algn="r">
+              <a:defRPr/>
+            </a:pPr>
+            <a:r>
+              <a:rPr sz="2800">
+                <a:solidFill>
+                  <a:schemeClr val="bg2">
+                    <a:lumMod val="90000"/>
+                  </a:schemeClr>
+                </a:solidFill>
+              </a:rPr>
+              <a:t>// </a:t>
+            </a:r>
+            <a:r>
+              <a:rPr sz="2800" u="none">
+                <a:solidFill>
+                  <a:schemeClr val="bg2">
+                    <a:lumMod val="90000"/>
+                  </a:schemeClr>
+                </a:solidFill>
+              </a:rPr>
+              <a:t>snippets</a:t>
+            </a:r>
+            <a:endParaRPr sz="2800">
+              <a:solidFill>
+                <a:schemeClr val="bg2">
+                  <a:lumMod val="90000"/>
+                </a:schemeClr>
+              </a:solidFill>
+            </a:endParaRPr>
+          </a:p>
+        </p:txBody>
+      </p:sp>
+      <p:pic>
+        <p:nvPicPr>
+          <p:cNvPr id="1155730431" name=""/>
+          <p:cNvPicPr>
+            <a:picLocks noChangeAspect="1"/>
+          </p:cNvPicPr>
+          <p:nvPr/>
+        </p:nvPicPr>
+        <p:blipFill>
+          <a:blip r:embed="rId2"/>
+          <a:stretch/>
+        </p:blipFill>
+        <p:spPr bwMode="auto">
+          <a:xfrm flipH="0" flipV="0">
+            <a:off x="9255384" y="5896551"/>
+            <a:ext cx="2961029" cy="962156"/>
+          </a:xfrm>
+          <a:prstGeom prst="rect">
+            <a:avLst/>
+          </a:prstGeom>
+        </p:spPr>
+      </p:pic>
+      <p:cxnSp>
+        <p:nvCxnSpPr>
+          <p:cNvPr id="885732279" name=""/>
+          <p:cNvCxnSpPr>
+            <a:cxnSpLocks/>
+          </p:cNvCxnSpPr>
+          <p:nvPr/>
+        </p:nvCxnSpPr>
+        <p:spPr bwMode="auto">
+          <a:xfrm flipH="0" flipV="1">
+            <a:off x="4343221" y="1580534"/>
+            <a:ext cx="7010578" cy="0"/>
+          </a:xfrm>
+          <a:prstGeom prst="line">
+            <a:avLst/>
+          </a:prstGeom>
+          <a:ln w="28575" cap="flat" cmpd="sng" algn="ctr">
+            <a:solidFill>
+              <a:schemeClr val="bg2">
+                <a:lumMod val="90196"/>
+              </a:schemeClr>
+            </a:solidFill>
+            <a:prstDash val="solid"/>
+            <a:miter lim="800000"/>
+          </a:ln>
+        </p:spPr>
+        <p:style>
+          <a:lnRef idx="1">
+            <a:schemeClr val="accent1">
+              <a:shade val="50000"/>
+            </a:schemeClr>
+          </a:lnRef>
+          <a:fillRef idx="0">
+            <a:schemeClr val="accent1"/>
+          </a:fillRef>
+          <a:effectRef idx="0">
+            <a:schemeClr val="accent1"/>
+          </a:effectRef>
+          <a:fontRef idx="minor">
+            <a:schemeClr val="tx1"/>
+          </a:fontRef>
+        </p:style>
+      </p:cxnSp>
+      <p:cxnSp>
+        <p:nvCxnSpPr>
+          <p:cNvPr id="579721613" name=""/>
+          <p:cNvCxnSpPr>
+            <a:cxnSpLocks/>
+          </p:cNvCxnSpPr>
+          <p:nvPr/>
+        </p:nvCxnSpPr>
+        <p:spPr bwMode="auto">
+          <a:xfrm flipH="0" flipV="1">
+            <a:off x="838198" y="1644894"/>
+            <a:ext cx="10515599" cy="0"/>
+          </a:xfrm>
+          <a:prstGeom prst="line">
+            <a:avLst/>
+          </a:prstGeom>
+          <a:ln w="28575" cap="flat" cmpd="sng" algn="ctr">
+            <a:solidFill>
+              <a:schemeClr val="bg2">
+                <a:lumMod val="90196"/>
+              </a:schemeClr>
+            </a:solidFill>
+            <a:prstDash val="solid"/>
+            <a:miter lim="800000"/>
+          </a:ln>
+        </p:spPr>
+        <p:style>
+          <a:lnRef idx="1">
+            <a:schemeClr val="accent1">
+              <a:shade val="50000"/>
+            </a:schemeClr>
+          </a:lnRef>
+          <a:fillRef idx="0">
+            <a:schemeClr val="accent1"/>
+          </a:fillRef>
+          <a:effectRef idx="0">
+            <a:schemeClr val="accent1"/>
+          </a:effectRef>
+          <a:fontRef idx="minor">
+            <a:schemeClr val="tx1"/>
+          </a:fontRef>
+        </p:style>
+      </p:cxnSp>
+      <p:pic>
+        <p:nvPicPr>
+          <p:cNvPr id="243074642" name=""/>
+          <p:cNvPicPr>
+            <a:picLocks noChangeAspect="1"/>
+          </p:cNvPicPr>
+          <p:nvPr/>
+        </p:nvPicPr>
+        <p:blipFill>
+          <a:blip r:embed="rId3"/>
+          <a:stretch/>
+        </p:blipFill>
+        <p:spPr bwMode="auto">
+          <a:xfrm flipH="1" flipV="0">
+            <a:off x="10790911" y="681003"/>
+            <a:ext cx="635375" cy="693801"/>
+          </a:xfrm>
+          <a:prstGeom prst="rect">
+            <a:avLst/>
+          </a:prstGeom>
+        </p:spPr>
+      </p:pic>
+      <p:pic>
+        <p:nvPicPr>
+          <p:cNvPr id="212114365" name=""/>
+          <p:cNvPicPr>
+            <a:picLocks noChangeAspect="1"/>
+          </p:cNvPicPr>
+          <p:nvPr/>
+        </p:nvPicPr>
+        <p:blipFill>
+          <a:blip r:embed="rId4"/>
+          <a:stretch/>
+        </p:blipFill>
+        <p:spPr bwMode="auto">
+          <a:xfrm flipH="0" flipV="0">
+            <a:off x="838197" y="1788367"/>
+            <a:ext cx="5157936" cy="1982755"/>
+          </a:xfrm>
+          <a:prstGeom prst="rect">
+            <a:avLst/>
+          </a:prstGeom>
+        </p:spPr>
+      </p:pic>
+      <p:pic>
+        <p:nvPicPr>
+          <p:cNvPr id="983925364" name=""/>
+          <p:cNvPicPr>
+            <a:picLocks noChangeAspect="1"/>
+          </p:cNvPicPr>
+          <p:nvPr/>
+        </p:nvPicPr>
+        <p:blipFill>
+          <a:blip r:embed="rId5"/>
+          <a:stretch/>
+        </p:blipFill>
+        <p:spPr bwMode="auto">
+          <a:xfrm flipH="0" flipV="0">
+            <a:off x="838197" y="3926632"/>
+            <a:ext cx="8467912" cy="1969918"/>
+          </a:xfrm>
+          <a:prstGeom prst="rect">
+            <a:avLst/>
+          </a:prstGeom>
+        </p:spPr>
+      </p:pic>
+    </p:spTree>
+  </p:cSld>
+  <p:clrMapOvr>
+    <a:masterClrMapping/>
+  </p:clrMapOvr>
+  <mc:AlternateContent xmlns:mc="http://schemas.openxmlformats.org/markup-compatibility/2006">
+    <mc:Choice xmlns:p14="http://schemas.microsoft.com/office/powerpoint/2010/main" Requires="p14">
+      <p:transition p14:dur="2000" advClick="1"/>
+    </mc:Choice>
+    <mc:Fallback>
+      <p:transition advClick="1"/>
+    </mc:Fallback>
+  </mc:AlternateContent>
+</p:sld>
+</file>
+
+<file path=ppt/slides/slide8.xml><?xml version="1.0" encoding="utf-8"?>
+<p:sld xmlns:a="http://schemas.openxmlformats.org/drawingml/2006/main" xmlns:r="http://schemas.openxmlformats.org/officeDocument/2006/relationships" xmlns:p="http://schemas.openxmlformats.org/presentationml/2006/main" xmlns:m="http://schemas.openxmlformats.org/officeDocument/2006/math" xmlns:w="http://schemas.openxmlformats.org/wordprocessingml/2006/main" showMasterPhAnim="0" show="1">
+  <p:cSld name="">
+    <p:spTree>
+      <p:nvGrpSpPr>
+        <p:cNvPr id="1" name=""/>
+        <p:cNvGrpSpPr/>
+        <p:nvPr/>
+      </p:nvGrpSpPr>
+      <p:grpSpPr bwMode="auto">
+        <a:xfrm>
+          <a:off x="0" y="0"/>
+          <a:ext cx="0" cy="0"/>
+          <a:chOff x="0" y="0"/>
+          <a:chExt cx="0" cy="0"/>
+        </a:xfrm>
+      </p:grpSpPr>
+      <p:sp>
+        <p:nvSpPr>
           <p:cNvPr id="1901759407" name="Title 1"/>
           <p:cNvSpPr>
             <a:spLocks noGrp="1"/>
@@ -5640,7 +5956,7 @@
 </p:sld>
 </file>
 
-<file path=ppt/slides/slide8.xml><?xml version="1.0" encoding="utf-8"?>
+<file path=ppt/slides/slide9.xml><?xml version="1.0" encoding="utf-8"?>
 <p:sld xmlns:a="http://schemas.openxmlformats.org/drawingml/2006/main" xmlns:r="http://schemas.openxmlformats.org/officeDocument/2006/relationships" xmlns:p="http://schemas.openxmlformats.org/presentationml/2006/main" xmlns:m="http://schemas.openxmlformats.org/officeDocument/2006/math" xmlns:w="http://schemas.openxmlformats.org/wordprocessingml/2006/main" showMasterPhAnim="0" show="1">
   <p:cSld name="">
     <p:bg>

</xml_diff>